<commit_message>
Adding Monday slides and pdf
</commit_message>
<xml_diff>
--- a/slides/On-Campus/09_01_OSandFileWriting.pptx
+++ b/slides/On-Campus/09_01_OSandFileWriting.pptx
@@ -337,7 +337,7 @@
           <a:p>
             <a:fld id="{4D7E51A5-B478-1E40-8CBB-0DAA8831E99D}" type="datetimeFigureOut">
               <a:rPr lang="en-US" smtClean="0"/>
-              <a:t>10/17/21</a:t>
+              <a:t>3/12/2022</a:t>
             </a:fld>
             <a:endParaRPr lang="en-US"/>
           </a:p>
@@ -502,7 +502,7 @@
           <a:p>
             <a:fld id="{D0ED587F-861E-6740-9643-E3DDAE89B8D6}" type="datetimeFigureOut">
               <a:rPr lang="en-US" smtClean="0"/>
-              <a:t>10/17/21</a:t>
+              <a:t>3/12/2022</a:t>
             </a:fld>
             <a:endParaRPr lang="en-US"/>
           </a:p>

</xml_diff>

<commit_message>
File Write ppt lecture
</commit_message>
<xml_diff>
--- a/slides/On-Campus/09_01_OSandFileWriting.pptx
+++ b/slides/On-Campus/09_01_OSandFileWriting.pptx
@@ -150,7 +150,7 @@
   <pc:docChgLst>
     <pc:chgData name="Marcia Moraes" userId="c9c67e8a-58e2-4733-9a1c-5d44fec4775b" providerId="ADAL" clId="{9C8383A8-73D2-4259-9F6A-069219C27C46}"/>
     <pc:docChg chg="undo custSel addSld delSld modSld sldOrd modMainMaster">
-      <pc:chgData name="Marcia Moraes" userId="c9c67e8a-58e2-4733-9a1c-5d44fec4775b" providerId="ADAL" clId="{9C8383A8-73D2-4259-9F6A-069219C27C46}" dt="2023-03-16T20:56:59.313" v="1254" actId="20577"/>
+      <pc:chgData name="Marcia Moraes" userId="c9c67e8a-58e2-4733-9a1c-5d44fec4775b" providerId="ADAL" clId="{9C8383A8-73D2-4259-9F6A-069219C27C46}" dt="2023-03-16T22:25:10.259" v="1275" actId="20577"/>
       <pc:docMkLst>
         <pc:docMk/>
       </pc:docMkLst>
@@ -405,7 +405,7 @@
         </pc:picChg>
       </pc:sldChg>
       <pc:sldChg chg="modSp">
-        <pc:chgData name="Marcia Moraes" userId="c9c67e8a-58e2-4733-9a1c-5d44fec4775b" providerId="ADAL" clId="{9C8383A8-73D2-4259-9F6A-069219C27C46}" dt="2023-03-16T20:56:59.313" v="1254" actId="20577"/>
+        <pc:chgData name="Marcia Moraes" userId="c9c67e8a-58e2-4733-9a1c-5d44fec4775b" providerId="ADAL" clId="{9C8383A8-73D2-4259-9F6A-069219C27C46}" dt="2023-03-16T22:25:10.259" v="1275" actId="20577"/>
         <pc:sldMkLst>
           <pc:docMk/>
           <pc:sldMk cId="2060984493" sldId="263"/>
@@ -419,7 +419,7 @@
           </ac:spMkLst>
         </pc:spChg>
         <pc:spChg chg="mod">
-          <ac:chgData name="Marcia Moraes" userId="c9c67e8a-58e2-4733-9a1c-5d44fec4775b" providerId="ADAL" clId="{9C8383A8-73D2-4259-9F6A-069219C27C46}" dt="2023-03-16T20:56:59.313" v="1254" actId="20577"/>
+          <ac:chgData name="Marcia Moraes" userId="c9c67e8a-58e2-4733-9a1c-5d44fec4775b" providerId="ADAL" clId="{9C8383A8-73D2-4259-9F6A-069219C27C46}" dt="2023-03-16T22:25:10.259" v="1275" actId="20577"/>
           <ac:spMkLst>
             <pc:docMk/>
             <pc:sldMk cId="2060984493" sldId="263"/>
@@ -16966,7 +16966,7 @@
         <p:spPr>
           <a:xfrm>
             <a:off x="628075" y="1626781"/>
-            <a:ext cx="12561453" cy="1177310"/>
+            <a:ext cx="12561453" cy="2066784"/>
           </a:xfrm>
         </p:spPr>
         <p:txBody>
@@ -16980,13 +16980,31 @@
             </a:r>
           </a:p>
           <a:p>
+            <a:pPr lvl="1" fontAlgn="base"/>
+            <a:r>
+              <a:rPr lang="en-US" sz="2200"/>
+              <a:t>Files available: </a:t>
+            </a:r>
+            <a:r>
+              <a:rPr lang="en-US" sz="2200">
+                <a:hlinkClick r:id="rId2"/>
+              </a:rPr>
+              <a:t>https://github.com/CSU-CompSci-CS163-4/Handouts/tree/main/ClassExamples/09FileWrite</a:t>
+            </a:r>
+            <a:r>
+              <a:rPr lang="en-US" sz="2200"/>
+              <a:t> </a:t>
+            </a:r>
+            <a:endParaRPr lang="en-US" sz="2200" dirty="0"/>
+          </a:p>
+          <a:p>
             <a:pPr fontAlgn="base"/>
             <a:r>
               <a:rPr lang="en-US" sz="2400" dirty="0"/>
               <a:t>In Class Activity on </a:t>
             </a:r>
             <a:r>
-              <a:rPr lang="en-US" sz="2400"/>
+              <a:rPr lang="en-US" sz="2400" dirty="0" err="1"/>
               <a:t>zybooks</a:t>
             </a:r>
             <a:endParaRPr lang="en-US" dirty="0"/>

</xml_diff>

<commit_message>
Module 9 lecture updated
</commit_message>
<xml_diff>
--- a/slides/On-Campus/09_01_OSandFileWriting.pptx
+++ b/slides/On-Campus/09_01_OSandFileWriting.pptx
@@ -152,38 +152,44 @@
   </pc:docChgLst>
   <pc:docChgLst>
     <pc:chgData name="Marcia Moraes" userId="c9c67e8a-58e2-4733-9a1c-5d44fec4775b" providerId="ADAL" clId="{46BE5373-9D09-4F87-A123-1FD85A8E0B47}"/>
-    <pc:docChg chg="modSld">
-      <pc:chgData name="Marcia Moraes" userId="c9c67e8a-58e2-4733-9a1c-5d44fec4775b" providerId="ADAL" clId="{46BE5373-9D09-4F87-A123-1FD85A8E0B47}" dt="2023-10-11T00:09:37.199" v="0"/>
+  </pc:docChgLst>
+  <pc:docChgLst>
+    <pc:chgData name="Moraes,Marcia" userId="c9c67e8a-58e2-4733-9a1c-5d44fec4775b" providerId="ADAL" clId="{0D3D1F53-216D-468A-B6D0-42132F61F75F}"/>
+  </pc:docChgLst>
+  <pc:docChgLst>
+    <pc:chgData name="Moraes,Marcia" userId="c9c67e8a-58e2-4733-9a1c-5d44fec4775b" providerId="ADAL" clId="{46BE5373-9D09-4F87-A123-1FD85A8E0B47}"/>
+  </pc:docChgLst>
+  <pc:docChgLst>
+    <pc:chgData name="Marcia Moraes" userId="c9c67e8a-58e2-4733-9a1c-5d44fec4775b" providerId="ADAL" clId="{E4CE0DD7-C744-4FD1-AF72-43B9FE76208B}"/>
+    <pc:docChg chg="custSel modSld">
+      <pc:chgData name="Marcia Moraes" userId="c9c67e8a-58e2-4733-9a1c-5d44fec4775b" providerId="ADAL" clId="{E4CE0DD7-C744-4FD1-AF72-43B9FE76208B}" dt="2024-03-06T15:31:14.453" v="2" actId="1076"/>
       <pc:docMkLst>
         <pc:docMk/>
       </pc:docMkLst>
-      <pc:sldChg chg="addSp">
-        <pc:chgData name="Marcia Moraes" userId="c9c67e8a-58e2-4733-9a1c-5d44fec4775b" providerId="ADAL" clId="{46BE5373-9D09-4F87-A123-1FD85A8E0B47}" dt="2023-10-11T00:09:37.199" v="0"/>
+      <pc:sldChg chg="addSp delSp modSp">
+        <pc:chgData name="Marcia Moraes" userId="c9c67e8a-58e2-4733-9a1c-5d44fec4775b" providerId="ADAL" clId="{E4CE0DD7-C744-4FD1-AF72-43B9FE76208B}" dt="2024-03-06T15:31:14.453" v="2" actId="1076"/>
         <pc:sldMkLst>
           <pc:docMk/>
           <pc:sldMk cId="2571368551" sldId="272"/>
         </pc:sldMkLst>
-        <pc:spChg chg="add">
-          <ac:chgData name="Marcia Moraes" userId="c9c67e8a-58e2-4733-9a1c-5d44fec4775b" providerId="ADAL" clId="{46BE5373-9D09-4F87-A123-1FD85A8E0B47}" dt="2023-10-11T00:09:37.199" v="0"/>
-          <ac:spMkLst>
-            <pc:docMk/>
-            <pc:sldMk cId="2571368551" sldId="272"/>
-            <ac:spMk id="6" creationId="{AA6A8138-6A98-4DE5-8EB4-C33E868FC3E1}"/>
-          </ac:spMkLst>
-        </pc:spChg>
-        <pc:graphicFrameChg chg="add">
-          <ac:chgData name="Marcia Moraes" userId="c9c67e8a-58e2-4733-9a1c-5d44fec4775b" providerId="ADAL" clId="{46BE5373-9D09-4F87-A123-1FD85A8E0B47}" dt="2023-10-11T00:09:37.199" v="0"/>
+        <pc:graphicFrameChg chg="del">
+          <ac:chgData name="Marcia Moraes" userId="c9c67e8a-58e2-4733-9a1c-5d44fec4775b" providerId="ADAL" clId="{E4CE0DD7-C744-4FD1-AF72-43B9FE76208B}" dt="2024-03-06T15:30:53.583" v="0" actId="478"/>
           <ac:graphicFrameMkLst>
             <pc:docMk/>
             <pc:sldMk cId="2571368551" sldId="272"/>
             <ac:graphicFrameMk id="7" creationId="{A32DE793-60F9-4A58-A1FB-790DB77845AA}"/>
           </ac:graphicFrameMkLst>
         </pc:graphicFrameChg>
+        <pc:graphicFrameChg chg="add mod">
+          <ac:chgData name="Marcia Moraes" userId="c9c67e8a-58e2-4733-9a1c-5d44fec4775b" providerId="ADAL" clId="{E4CE0DD7-C744-4FD1-AF72-43B9FE76208B}" dt="2024-03-06T15:31:14.453" v="2" actId="1076"/>
+          <ac:graphicFrameMkLst>
+            <pc:docMk/>
+            <pc:sldMk cId="2571368551" sldId="272"/>
+            <ac:graphicFrameMk id="8" creationId="{5DC24B50-0BD3-45AB-8653-28927089CA5A}"/>
+          </ac:graphicFrameMkLst>
+        </pc:graphicFrameChg>
       </pc:sldChg>
     </pc:docChg>
-  </pc:docChgLst>
-  <pc:docChgLst>
-    <pc:chgData name="Moraes,Marcia" userId="c9c67e8a-58e2-4733-9a1c-5d44fec4775b" providerId="ADAL" clId="{0D3D1F53-216D-468A-B6D0-42132F61F75F}"/>
   </pc:docChgLst>
 </pc:chgInfo>
 </file>
@@ -270,7 +276,7 @@
           <a:p>
             <a:fld id="{4D7E51A5-B478-1E40-8CBB-0DAA8831E99D}" type="datetimeFigureOut">
               <a:rPr lang="en-US" smtClean="0"/>
-              <a:t>10/11/2023</a:t>
+              <a:t>3/6/2024</a:t>
             </a:fld>
             <a:endParaRPr lang="en-US"/>
           </a:p>
@@ -435,7 +441,7 @@
           <a:p>
             <a:fld id="{D0ED587F-861E-6740-9643-E3DDAE89B8D6}" type="datetimeFigureOut">
               <a:rPr lang="en-US" smtClean="0"/>
-              <a:t>10/11/2023</a:t>
+              <a:t>3/6/2024</a:t>
             </a:fld>
             <a:endParaRPr lang="en-US"/>
           </a:p>
@@ -16419,7 +16425,7 @@
         </p:nvSpPr>
         <p:spPr>
           <a:xfrm>
-            <a:off x="628075" y="1681593"/>
+            <a:off x="497446" y="1441823"/>
             <a:ext cx="10518896" cy="5293757"/>
           </a:xfrm>
           <a:prstGeom prst="rect">
@@ -16719,7 +16725,7 @@
                 <a:cs typeface="Arial"/>
                 <a:sym typeface="Arial"/>
               </a:rPr>
-              <a:t>11</a:t>
+              <a:t>11 – participation activity due in lab</a:t>
             </a:r>
           </a:p>
           <a:p>
@@ -16797,7 +16803,7 @@
                 <a:cs typeface="Arial"/>
                 <a:sym typeface="Arial"/>
               </a:rPr>
-              <a:t>Lab 12</a:t>
+              <a:t>Lab 12 – participation activity due in lab</a:t>
             </a:r>
           </a:p>
           <a:p>
@@ -17174,10 +17180,10 @@
       </p:sp>
       <p:graphicFrame>
         <p:nvGraphicFramePr>
-          <p:cNvPr id="7" name="Table 6">
+          <p:cNvPr id="8" name="Table 7">
             <a:extLst>
               <a:ext uri="{FF2B5EF4-FFF2-40B4-BE49-F238E27FC236}">
-                <a16:creationId xmlns:a16="http://schemas.microsoft.com/office/drawing/2014/main" id="{A32DE793-60F9-4A58-A1FB-790DB77845AA}"/>
+                <a16:creationId xmlns:a16="http://schemas.microsoft.com/office/drawing/2014/main" id="{5DC24B50-0BD3-45AB-8653-28927089CA5A}"/>
               </a:ext>
             </a:extLst>
           </p:cNvPr>
@@ -17187,121 +17193,92 @@
           <p:nvPr>
             <p:extLst>
               <p:ext uri="{D42A27DB-BD31-4B8C-83A1-F6EECF244321}">
-                <p14:modId xmlns:p14="http://schemas.microsoft.com/office/powerpoint/2010/main" val="3085342150"/>
+                <p14:modId xmlns:p14="http://schemas.microsoft.com/office/powerpoint/2010/main" val="2801261929"/>
               </p:ext>
             </p:extLst>
           </p:nvPr>
         </p:nvGraphicFramePr>
         <p:xfrm>
-          <a:off x="9987253" y="3863702"/>
-          <a:ext cx="3572199" cy="3253859"/>
+          <a:off x="10025176" y="3998912"/>
+          <a:ext cx="3671207" cy="3097098"/>
         </p:xfrm>
         <a:graphic>
           <a:graphicData uri="http://schemas.openxmlformats.org/drawingml/2006/table">
             <a:tbl>
-              <a:tblPr firstRow="1">
-                <a:tableStyleId>{5C22544A-7EE6-4342-B048-85BDC9FD1C3A}</a:tableStyleId>
-              </a:tblPr>
+              <a:tblPr/>
               <a:tblGrid>
-                <a:gridCol w="1105468">
+                <a:gridCol w="1197995">
                   <a:extLst>
                     <a:ext uri="{9D8B030D-6E8A-4147-A177-3AD203B41FA5}">
-                      <a16:colId xmlns:a16="http://schemas.microsoft.com/office/drawing/2014/main" val="1333462331"/>
+                      <a16:colId xmlns:a16="http://schemas.microsoft.com/office/drawing/2014/main" val="3463123554"/>
                     </a:ext>
                   </a:extLst>
                 </a:gridCol>
-                <a:gridCol w="2466731">
+                <a:gridCol w="2473212">
                   <a:extLst>
                     <a:ext uri="{9D8B030D-6E8A-4147-A177-3AD203B41FA5}">
-                      <a16:colId xmlns:a16="http://schemas.microsoft.com/office/drawing/2014/main" val="668155110"/>
+                      <a16:colId xmlns:a16="http://schemas.microsoft.com/office/drawing/2014/main" val="378576746"/>
                     </a:ext>
                   </a:extLst>
                 </a:gridCol>
               </a:tblGrid>
-              <a:tr h="165373">
+              <a:tr h="289830">
                 <a:tc>
                   <a:txBody>
                     <a:bodyPr/>
                     <a:lstStyle/>
                     <a:p>
-                      <a:pPr marL="0" marR="0">
-                        <a:lnSpc>
-                          <a:spcPct val="107000"/>
-                        </a:lnSpc>
-                        <a:spcBef>
-                          <a:spcPts val="0"/>
-                        </a:spcBef>
-                        <a:spcAft>
-                          <a:spcPts val="800"/>
-                        </a:spcAft>
-                      </a:pPr>
+                      <a:pPr algn="l"/>
                       <a:r>
-                        <a:rPr lang="en-US" sz="1600" dirty="0">
+                        <a:rPr lang="en-US" sz="1700">
                           <a:solidFill>
-                            <a:schemeClr val="tx1"/>
+                            <a:srgbClr val="000000"/>
                           </a:solidFill>
                           <a:effectLst/>
                         </a:rPr>
                         <a:t>Day</a:t>
                       </a:r>
-                      <a:endParaRPr lang="en-US" sz="1600" dirty="0">
-                        <a:solidFill>
-                          <a:schemeClr val="tx1"/>
-                        </a:solidFill>
-                        <a:effectLst/>
-                        <a:latin typeface="Calibri" panose="020F0502020204030204" pitchFamily="34" charset="0"/>
-                        <a:ea typeface="Calibri" panose="020F0502020204030204" pitchFamily="34" charset="0"/>
-                        <a:cs typeface="Times New Roman" panose="02020603050405020304" pitchFamily="18" charset="0"/>
-                      </a:endParaRPr>
                     </a:p>
                   </a:txBody>
-                  <a:tcPr marL="15875" marR="15875" marT="15875" marB="15875" anchor="ctr">
-                    <a:lnL w="12700" cap="flat" cmpd="sng" algn="ctr">
+                  <a:tcPr marL="15681" marR="15681" marT="15681" marB="15681" anchor="ctr">
+                    <a:lnL w="6350" cap="flat" cmpd="sng" algn="ctr">
                       <a:solidFill>
-                        <a:schemeClr val="tx1"/>
+                        <a:srgbClr val="E0E0E0"/>
                       </a:solidFill>
                       <a:prstDash val="solid"/>
                       <a:round/>
                       <a:headEnd type="none" w="med" len="med"/>
                       <a:tailEnd type="none" w="med" len="med"/>
                     </a:lnL>
-                    <a:lnR w="12700" cap="flat" cmpd="sng" algn="ctr">
+                    <a:lnR w="6350" cap="flat" cmpd="sng" algn="ctr">
                       <a:solidFill>
-                        <a:schemeClr val="tx1"/>
+                        <a:srgbClr val="E0E0E0"/>
                       </a:solidFill>
                       <a:prstDash val="solid"/>
                       <a:round/>
                       <a:headEnd type="none" w="med" len="med"/>
                       <a:tailEnd type="none" w="med" len="med"/>
                     </a:lnR>
-                    <a:lnT w="12700" cap="flat" cmpd="sng" algn="ctr">
+                    <a:lnT w="6350" cap="flat" cmpd="sng" algn="ctr">
                       <a:solidFill>
-                        <a:schemeClr val="tx1"/>
+                        <a:srgbClr val="E0E0E0"/>
                       </a:solidFill>
                       <a:prstDash val="solid"/>
                       <a:round/>
                       <a:headEnd type="none" w="med" len="med"/>
                       <a:tailEnd type="none" w="med" len="med"/>
                     </a:lnT>
-                    <a:lnB w="12700" cap="flat" cmpd="sng" algn="ctr">
+                    <a:lnB w="6350" cap="flat" cmpd="sng" algn="ctr">
                       <a:solidFill>
-                        <a:schemeClr val="tx1"/>
+                        <a:srgbClr val="E0E0E0"/>
                       </a:solidFill>
                       <a:prstDash val="solid"/>
                       <a:round/>
                       <a:headEnd type="none" w="med" len="med"/>
                       <a:tailEnd type="none" w="med" len="med"/>
                     </a:lnB>
-                    <a:lnTlToBr w="12700" cmpd="sng">
-                      <a:noFill/>
-                      <a:prstDash val="solid"/>
-                    </a:lnTlToBr>
-                    <a:lnBlToTr w="12700" cmpd="sng">
-                      <a:noFill/>
-                      <a:prstDash val="solid"/>
-                    </a:lnBlToTr>
                     <a:solidFill>
-                      <a:schemeClr val="bg1"/>
+                      <a:srgbClr val="F7F7F7"/>
                     </a:solidFill>
                   </a:tcPr>
                 </a:tc>
@@ -17310,171 +17287,119 @@
                     <a:bodyPr/>
                     <a:lstStyle/>
                     <a:p>
-                      <a:pPr marL="0" marR="0">
-                        <a:lnSpc>
-                          <a:spcPct val="107000"/>
-                        </a:lnSpc>
-                        <a:spcBef>
-                          <a:spcPts val="0"/>
-                        </a:spcBef>
-                        <a:spcAft>
-                          <a:spcPts val="800"/>
-                        </a:spcAft>
-                      </a:pPr>
+                      <a:pPr algn="l"/>
                       <a:r>
-                        <a:rPr lang="en-US" sz="1600" dirty="0">
+                        <a:rPr lang="en-US" sz="1700" dirty="0">
                           <a:solidFill>
-                            <a:schemeClr val="tx1"/>
+                            <a:srgbClr val="000000"/>
                           </a:solidFill>
                           <a:effectLst/>
                         </a:rPr>
                         <a:t>Time : Room</a:t>
                       </a:r>
-                      <a:endParaRPr lang="en-US" sz="1600" dirty="0">
-                        <a:solidFill>
-                          <a:schemeClr val="tx1"/>
-                        </a:solidFill>
-                        <a:effectLst/>
-                        <a:latin typeface="Calibri" panose="020F0502020204030204" pitchFamily="34" charset="0"/>
-                        <a:ea typeface="Calibri" panose="020F0502020204030204" pitchFamily="34" charset="0"/>
-                        <a:cs typeface="Times New Roman" panose="02020603050405020304" pitchFamily="18" charset="0"/>
-                      </a:endParaRPr>
                     </a:p>
                   </a:txBody>
-                  <a:tcPr marL="15875" marR="15875" marT="15875" marB="15875" anchor="ctr">
-                    <a:lnL w="12700" cap="flat" cmpd="sng" algn="ctr">
+                  <a:tcPr marL="15681" marR="15681" marT="15681" marB="15681" anchor="ctr">
+                    <a:lnL w="6350" cap="flat" cmpd="sng" algn="ctr">
                       <a:solidFill>
-                        <a:schemeClr val="tx1"/>
+                        <a:srgbClr val="E0E0E0"/>
                       </a:solidFill>
                       <a:prstDash val="solid"/>
                       <a:round/>
                       <a:headEnd type="none" w="med" len="med"/>
                       <a:tailEnd type="none" w="med" len="med"/>
                     </a:lnL>
-                    <a:lnR w="12700" cap="flat" cmpd="sng" algn="ctr">
+                    <a:lnR w="6350" cap="flat" cmpd="sng" algn="ctr">
                       <a:solidFill>
-                        <a:schemeClr val="tx1"/>
+                        <a:srgbClr val="E0E0E0"/>
                       </a:solidFill>
                       <a:prstDash val="solid"/>
                       <a:round/>
                       <a:headEnd type="none" w="med" len="med"/>
                       <a:tailEnd type="none" w="med" len="med"/>
                     </a:lnR>
-                    <a:lnT w="12700" cap="flat" cmpd="sng" algn="ctr">
+                    <a:lnT w="6350" cap="flat" cmpd="sng" algn="ctr">
                       <a:solidFill>
-                        <a:schemeClr val="tx1"/>
+                        <a:srgbClr val="E0E0E0"/>
                       </a:solidFill>
                       <a:prstDash val="solid"/>
                       <a:round/>
                       <a:headEnd type="none" w="med" len="med"/>
                       <a:tailEnd type="none" w="med" len="med"/>
                     </a:lnT>
-                    <a:lnB w="12700" cap="flat" cmpd="sng" algn="ctr">
+                    <a:lnB w="6350" cap="flat" cmpd="sng" algn="ctr">
                       <a:solidFill>
-                        <a:schemeClr val="tx1"/>
+                        <a:srgbClr val="E0E0E0"/>
                       </a:solidFill>
                       <a:prstDash val="solid"/>
                       <a:round/>
                       <a:headEnd type="none" w="med" len="med"/>
                       <a:tailEnd type="none" w="med" len="med"/>
                     </a:lnB>
-                    <a:lnTlToBr w="12700" cmpd="sng">
-                      <a:noFill/>
-                      <a:prstDash val="solid"/>
-                    </a:lnTlToBr>
-                    <a:lnBlToTr w="12700" cmpd="sng">
-                      <a:noFill/>
-                      <a:prstDash val="solid"/>
-                    </a:lnBlToTr>
                     <a:solidFill>
-                      <a:schemeClr val="bg1"/>
+                      <a:srgbClr val="F7F7F7"/>
                     </a:solidFill>
                   </a:tcPr>
                 </a:tc>
                 <a:extLst>
                   <a:ext uri="{0D108BD9-81ED-4DB2-BD59-A6C34878D82A}">
-                    <a16:rowId xmlns:a16="http://schemas.microsoft.com/office/drawing/2014/main" val="3093163206"/>
+                    <a16:rowId xmlns:a16="http://schemas.microsoft.com/office/drawing/2014/main" val="3967578678"/>
                   </a:ext>
                 </a:extLst>
               </a:tr>
-              <a:tr h="581669">
+              <a:tr h="548296">
                 <a:tc>
                   <a:txBody>
                     <a:bodyPr/>
                     <a:lstStyle/>
                     <a:p>
-                      <a:pPr marL="0" marR="0">
-                        <a:lnSpc>
-                          <a:spcPct val="107000"/>
-                        </a:lnSpc>
-                        <a:spcBef>
-                          <a:spcPts val="0"/>
-                        </a:spcBef>
-                        <a:spcAft>
-                          <a:spcPts val="800"/>
-                        </a:spcAft>
-                      </a:pPr>
                       <a:r>
-                        <a:rPr lang="en-US" sz="1600" dirty="0">
+                        <a:rPr lang="en-US" sz="1700">
                           <a:effectLst/>
                         </a:rPr>
                         <a:t>Monday</a:t>
                       </a:r>
-                      <a:endParaRPr lang="en-US" sz="1600" dirty="0">
-                        <a:effectLst/>
-                        <a:latin typeface="Calibri" panose="020F0502020204030204" pitchFamily="34" charset="0"/>
-                        <a:ea typeface="Calibri" panose="020F0502020204030204" pitchFamily="34" charset="0"/>
-                        <a:cs typeface="Times New Roman" panose="02020603050405020304" pitchFamily="18" charset="0"/>
-                      </a:endParaRPr>
                     </a:p>
                   </a:txBody>
-                  <a:tcPr marL="15875" marR="15875" marT="15875" marB="15875" anchor="ctr">
-                    <a:lnL w="12700" cap="flat" cmpd="sng" algn="ctr">
+                  <a:tcPr marL="15681" marR="15681" marT="15681" marB="15681" anchor="ctr">
+                    <a:lnL w="6350" cap="flat" cmpd="sng" algn="ctr">
                       <a:solidFill>
-                        <a:schemeClr val="tx1"/>
+                        <a:srgbClr val="E0E0E0"/>
                       </a:solidFill>
                       <a:prstDash val="solid"/>
                       <a:round/>
                       <a:headEnd type="none" w="med" len="med"/>
                       <a:tailEnd type="none" w="med" len="med"/>
                     </a:lnL>
-                    <a:lnR w="12700" cap="flat" cmpd="sng" algn="ctr">
+                    <a:lnR w="6350" cap="flat" cmpd="sng" algn="ctr">
                       <a:solidFill>
-                        <a:schemeClr val="tx1"/>
+                        <a:srgbClr val="E0E0E0"/>
                       </a:solidFill>
                       <a:prstDash val="solid"/>
                       <a:round/>
                       <a:headEnd type="none" w="med" len="med"/>
                       <a:tailEnd type="none" w="med" len="med"/>
                     </a:lnR>
-                    <a:lnT w="12700" cap="flat" cmpd="sng" algn="ctr">
+                    <a:lnT w="6350" cap="flat" cmpd="sng" algn="ctr">
                       <a:solidFill>
-                        <a:schemeClr val="tx1"/>
+                        <a:srgbClr val="E0E0E0"/>
                       </a:solidFill>
                       <a:prstDash val="solid"/>
                       <a:round/>
                       <a:headEnd type="none" w="med" len="med"/>
                       <a:tailEnd type="none" w="med" len="med"/>
                     </a:lnT>
-                    <a:lnB w="12700" cap="flat" cmpd="sng" algn="ctr">
+                    <a:lnB w="6350" cap="flat" cmpd="sng" algn="ctr">
                       <a:solidFill>
-                        <a:schemeClr val="tx1"/>
+                        <a:srgbClr val="E0E0E0"/>
                       </a:solidFill>
                       <a:prstDash val="solid"/>
                       <a:round/>
                       <a:headEnd type="none" w="med" len="med"/>
                       <a:tailEnd type="none" w="med" len="med"/>
                     </a:lnB>
-                    <a:lnTlToBr w="12700" cmpd="sng">
-                      <a:noFill/>
-                      <a:prstDash val="solid"/>
-                    </a:lnTlToBr>
-                    <a:lnBlToTr w="12700" cmpd="sng">
-                      <a:noFill/>
-                      <a:prstDash val="solid"/>
-                    </a:lnBlToTr>
                     <a:solidFill>
-                      <a:schemeClr val="bg1"/>
+                      <a:srgbClr val="FFFFFF"/>
                     </a:solidFill>
                   </a:tcPr>
                 </a:tc>
@@ -17483,165 +17408,133 @@
                     <a:bodyPr/>
                     <a:lstStyle/>
                     <a:p>
-                      <a:pPr marL="0" marR="0">
-                        <a:lnSpc>
-                          <a:spcPct val="107000"/>
-                        </a:lnSpc>
-                        <a:spcBef>
-                          <a:spcPts val="0"/>
-                        </a:spcBef>
-                        <a:spcAft>
-                          <a:spcPts val="800"/>
-                        </a:spcAft>
-                      </a:pPr>
                       <a:r>
-                        <a:rPr lang="en-US" sz="1600" dirty="0">
+                        <a:rPr lang="en-US" sz="1700">
                           <a:effectLst/>
                         </a:rPr>
-                        <a:t>12 PM - 2 PM : CSB 120</a:t>
+                        <a:t>3 </a:t>
                       </a:r>
-                      <a:endParaRPr lang="en-US" sz="1600" dirty="0">
-                        <a:effectLst/>
-                        <a:latin typeface="Calibri" panose="020F0502020204030204" pitchFamily="34" charset="0"/>
-                        <a:ea typeface="Calibri" panose="020F0502020204030204" pitchFamily="34" charset="0"/>
-                        <a:cs typeface="Times New Roman" panose="02020603050405020304" pitchFamily="18" charset="0"/>
-                      </a:endParaRPr>
+                      <a:r>
+                        <a:rPr lang="en-US" sz="1700" dirty="0">
+                          <a:effectLst/>
+                        </a:rPr>
+                        <a:t>PM </a:t>
+                      </a:r>
+                      <a:r>
+                        <a:rPr lang="en-US" sz="1700">
+                          <a:effectLst/>
+                        </a:rPr>
+                        <a:t>- 5 </a:t>
+                      </a:r>
+                      <a:r>
+                        <a:rPr lang="en-US" sz="1700" dirty="0">
+                          <a:effectLst/>
+                        </a:rPr>
+                        <a:t>PM : CSB 120</a:t>
+                      </a:r>
                     </a:p>
                   </a:txBody>
-                  <a:tcPr marL="15875" marR="15875" marT="15875" marB="15875" anchor="ctr">
-                    <a:lnL w="12700" cap="flat" cmpd="sng" algn="ctr">
+                  <a:tcPr marL="15681" marR="15681" marT="15681" marB="15681" anchor="ctr">
+                    <a:lnL w="6350" cap="flat" cmpd="sng" algn="ctr">
                       <a:solidFill>
-                        <a:schemeClr val="tx1"/>
+                        <a:srgbClr val="E0E0E0"/>
                       </a:solidFill>
                       <a:prstDash val="solid"/>
                       <a:round/>
                       <a:headEnd type="none" w="med" len="med"/>
                       <a:tailEnd type="none" w="med" len="med"/>
                     </a:lnL>
-                    <a:lnR w="12700" cap="flat" cmpd="sng" algn="ctr">
+                    <a:lnR w="6350" cap="flat" cmpd="sng" algn="ctr">
                       <a:solidFill>
-                        <a:schemeClr val="tx1"/>
+                        <a:srgbClr val="E0E0E0"/>
                       </a:solidFill>
                       <a:prstDash val="solid"/>
                       <a:round/>
                       <a:headEnd type="none" w="med" len="med"/>
                       <a:tailEnd type="none" w="med" len="med"/>
                     </a:lnR>
-                    <a:lnT w="12700" cap="flat" cmpd="sng" algn="ctr">
+                    <a:lnT w="6350" cap="flat" cmpd="sng" algn="ctr">
                       <a:solidFill>
-                        <a:schemeClr val="tx1"/>
+                        <a:srgbClr val="E0E0E0"/>
                       </a:solidFill>
                       <a:prstDash val="solid"/>
                       <a:round/>
                       <a:headEnd type="none" w="med" len="med"/>
                       <a:tailEnd type="none" w="med" len="med"/>
                     </a:lnT>
-                    <a:lnB w="12700" cap="flat" cmpd="sng" algn="ctr">
+                    <a:lnB w="6350" cap="flat" cmpd="sng" algn="ctr">
                       <a:solidFill>
-                        <a:schemeClr val="tx1"/>
+                        <a:srgbClr val="E0E0E0"/>
                       </a:solidFill>
                       <a:prstDash val="solid"/>
                       <a:round/>
                       <a:headEnd type="none" w="med" len="med"/>
                       <a:tailEnd type="none" w="med" len="med"/>
                     </a:lnB>
-                    <a:lnTlToBr w="12700" cmpd="sng">
-                      <a:noFill/>
-                      <a:prstDash val="solid"/>
-                    </a:lnTlToBr>
-                    <a:lnBlToTr w="12700" cmpd="sng">
-                      <a:noFill/>
-                      <a:prstDash val="solid"/>
-                    </a:lnBlToTr>
                     <a:solidFill>
-                      <a:schemeClr val="bg1"/>
+                      <a:srgbClr val="FFFFFF"/>
                     </a:solidFill>
                   </a:tcPr>
                 </a:tc>
                 <a:extLst>
                   <a:ext uri="{0D108BD9-81ED-4DB2-BD59-A6C34878D82A}">
-                    <a16:rowId xmlns:a16="http://schemas.microsoft.com/office/drawing/2014/main" val="1139786997"/>
+                    <a16:rowId xmlns:a16="http://schemas.microsoft.com/office/drawing/2014/main" val="4272848274"/>
                   </a:ext>
                 </a:extLst>
               </a:tr>
-              <a:tr h="307347">
+              <a:tr h="289830">
                 <a:tc>
                   <a:txBody>
                     <a:bodyPr/>
                     <a:lstStyle/>
                     <a:p>
-                      <a:pPr marL="0" marR="0">
-                        <a:lnSpc>
-                          <a:spcPct val="107000"/>
-                        </a:lnSpc>
-                        <a:spcBef>
-                          <a:spcPts val="0"/>
-                        </a:spcBef>
-                        <a:spcAft>
-                          <a:spcPts val="800"/>
-                        </a:spcAft>
-                      </a:pPr>
                       <a:r>
-                        <a:rPr lang="en-US" sz="1600">
+                        <a:rPr lang="en-US" sz="1700">
                           <a:effectLst/>
                         </a:rPr>
                         <a:t>Tuesday</a:t>
                       </a:r>
-                      <a:endParaRPr lang="en-US" sz="1600">
-                        <a:effectLst/>
-                        <a:latin typeface="Calibri" panose="020F0502020204030204" pitchFamily="34" charset="0"/>
-                        <a:ea typeface="Calibri" panose="020F0502020204030204" pitchFamily="34" charset="0"/>
-                        <a:cs typeface="Times New Roman" panose="02020603050405020304" pitchFamily="18" charset="0"/>
-                      </a:endParaRPr>
                     </a:p>
                   </a:txBody>
-                  <a:tcPr marL="15875" marR="15875" marT="15875" marB="15875" anchor="ctr">
-                    <a:lnL w="12700" cap="flat" cmpd="sng" algn="ctr">
+                  <a:tcPr marL="15681" marR="15681" marT="15681" marB="15681" anchor="ctr">
+                    <a:lnL w="6350" cap="flat" cmpd="sng" algn="ctr">
                       <a:solidFill>
-                        <a:schemeClr val="tx1"/>
+                        <a:srgbClr val="E0E0E0"/>
                       </a:solidFill>
                       <a:prstDash val="solid"/>
                       <a:round/>
                       <a:headEnd type="none" w="med" len="med"/>
                       <a:tailEnd type="none" w="med" len="med"/>
                     </a:lnL>
-                    <a:lnR w="12700" cap="flat" cmpd="sng" algn="ctr">
+                    <a:lnR w="6350" cap="flat" cmpd="sng" algn="ctr">
                       <a:solidFill>
-                        <a:schemeClr val="tx1"/>
+                        <a:srgbClr val="E0E0E0"/>
                       </a:solidFill>
                       <a:prstDash val="solid"/>
                       <a:round/>
                       <a:headEnd type="none" w="med" len="med"/>
                       <a:tailEnd type="none" w="med" len="med"/>
                     </a:lnR>
-                    <a:lnT w="12700" cap="flat" cmpd="sng" algn="ctr">
+                    <a:lnT w="6350" cap="flat" cmpd="sng" algn="ctr">
                       <a:solidFill>
-                        <a:schemeClr val="tx1"/>
+                        <a:srgbClr val="E0E0E0"/>
                       </a:solidFill>
                       <a:prstDash val="solid"/>
                       <a:round/>
                       <a:headEnd type="none" w="med" len="med"/>
                       <a:tailEnd type="none" w="med" len="med"/>
                     </a:lnT>
-                    <a:lnB w="12700" cap="flat" cmpd="sng" algn="ctr">
+                    <a:lnB w="6350" cap="flat" cmpd="sng" algn="ctr">
                       <a:solidFill>
-                        <a:schemeClr val="tx1"/>
+                        <a:srgbClr val="E0E0E0"/>
                       </a:solidFill>
                       <a:prstDash val="solid"/>
                       <a:round/>
                       <a:headEnd type="none" w="med" len="med"/>
                       <a:tailEnd type="none" w="med" len="med"/>
                     </a:lnB>
-                    <a:lnTlToBr w="12700" cmpd="sng">
-                      <a:noFill/>
-                      <a:prstDash val="solid"/>
-                    </a:lnTlToBr>
-                    <a:lnBlToTr w="12700" cmpd="sng">
-                      <a:noFill/>
-                      <a:prstDash val="solid"/>
-                    </a:lnBlToTr>
                     <a:solidFill>
-                      <a:schemeClr val="bg1"/>
+                      <a:srgbClr val="FFFFFF"/>
                     </a:solidFill>
                   </a:tcPr>
                 </a:tc>
@@ -17650,165 +17543,115 @@
                     <a:bodyPr/>
                     <a:lstStyle/>
                     <a:p>
-                      <a:pPr marL="0" marR="0">
-                        <a:lnSpc>
-                          <a:spcPct val="107000"/>
-                        </a:lnSpc>
-                        <a:spcBef>
-                          <a:spcPts val="0"/>
-                        </a:spcBef>
-                        <a:spcAft>
-                          <a:spcPts val="800"/>
-                        </a:spcAft>
-                      </a:pPr>
                       <a:r>
-                        <a:rPr lang="en-US" sz="1600">
+                        <a:rPr lang="en-US" sz="1700">
                           <a:effectLst/>
                         </a:rPr>
                         <a:t>6 PM - 8 PM : Teams</a:t>
                       </a:r>
-                      <a:endParaRPr lang="en-US" sz="1600">
-                        <a:effectLst/>
-                        <a:latin typeface="Calibri" panose="020F0502020204030204" pitchFamily="34" charset="0"/>
-                        <a:ea typeface="Calibri" panose="020F0502020204030204" pitchFamily="34" charset="0"/>
-                        <a:cs typeface="Times New Roman" panose="02020603050405020304" pitchFamily="18" charset="0"/>
-                      </a:endParaRPr>
                     </a:p>
                   </a:txBody>
-                  <a:tcPr marL="15875" marR="15875" marT="15875" marB="15875" anchor="ctr">
-                    <a:lnL w="12700" cap="flat" cmpd="sng" algn="ctr">
+                  <a:tcPr marL="15681" marR="15681" marT="15681" marB="15681" anchor="ctr">
+                    <a:lnL w="6350" cap="flat" cmpd="sng" algn="ctr">
                       <a:solidFill>
-                        <a:schemeClr val="tx1"/>
+                        <a:srgbClr val="E0E0E0"/>
                       </a:solidFill>
                       <a:prstDash val="solid"/>
                       <a:round/>
                       <a:headEnd type="none" w="med" len="med"/>
                       <a:tailEnd type="none" w="med" len="med"/>
                     </a:lnL>
-                    <a:lnR w="12700" cap="flat" cmpd="sng" algn="ctr">
+                    <a:lnR w="6350" cap="flat" cmpd="sng" algn="ctr">
                       <a:solidFill>
-                        <a:schemeClr val="tx1"/>
+                        <a:srgbClr val="E0E0E0"/>
                       </a:solidFill>
                       <a:prstDash val="solid"/>
                       <a:round/>
                       <a:headEnd type="none" w="med" len="med"/>
                       <a:tailEnd type="none" w="med" len="med"/>
                     </a:lnR>
-                    <a:lnT w="12700" cap="flat" cmpd="sng" algn="ctr">
+                    <a:lnT w="6350" cap="flat" cmpd="sng" algn="ctr">
                       <a:solidFill>
-                        <a:schemeClr val="tx1"/>
+                        <a:srgbClr val="E0E0E0"/>
                       </a:solidFill>
                       <a:prstDash val="solid"/>
                       <a:round/>
                       <a:headEnd type="none" w="med" len="med"/>
                       <a:tailEnd type="none" w="med" len="med"/>
                     </a:lnT>
-                    <a:lnB w="12700" cap="flat" cmpd="sng" algn="ctr">
+                    <a:lnB w="6350" cap="flat" cmpd="sng" algn="ctr">
                       <a:solidFill>
-                        <a:schemeClr val="tx1"/>
+                        <a:srgbClr val="E0E0E0"/>
                       </a:solidFill>
                       <a:prstDash val="solid"/>
                       <a:round/>
                       <a:headEnd type="none" w="med" len="med"/>
                       <a:tailEnd type="none" w="med" len="med"/>
                     </a:lnB>
-                    <a:lnTlToBr w="12700" cmpd="sng">
-                      <a:noFill/>
-                      <a:prstDash val="solid"/>
-                    </a:lnTlToBr>
-                    <a:lnBlToTr w="12700" cmpd="sng">
-                      <a:noFill/>
-                      <a:prstDash val="solid"/>
-                    </a:lnBlToTr>
                     <a:solidFill>
-                      <a:schemeClr val="bg1"/>
+                      <a:srgbClr val="FFFFFF"/>
                     </a:solidFill>
                   </a:tcPr>
                 </a:tc>
                 <a:extLst>
                   <a:ext uri="{0D108BD9-81ED-4DB2-BD59-A6C34878D82A}">
-                    <a16:rowId xmlns:a16="http://schemas.microsoft.com/office/drawing/2014/main" val="1164388044"/>
+                    <a16:rowId xmlns:a16="http://schemas.microsoft.com/office/drawing/2014/main" val="369786881"/>
                   </a:ext>
                 </a:extLst>
               </a:tr>
-              <a:tr h="581669">
+              <a:tr h="548296">
                 <a:tc>
                   <a:txBody>
                     <a:bodyPr/>
                     <a:lstStyle/>
                     <a:p>
-                      <a:pPr marL="0" marR="0">
-                        <a:lnSpc>
-                          <a:spcPct val="107000"/>
-                        </a:lnSpc>
-                        <a:spcBef>
-                          <a:spcPts val="0"/>
-                        </a:spcBef>
-                        <a:spcAft>
-                          <a:spcPts val="800"/>
-                        </a:spcAft>
-                      </a:pPr>
                       <a:r>
-                        <a:rPr lang="en-US" sz="1600">
+                        <a:rPr lang="en-US" sz="1700">
                           <a:effectLst/>
                         </a:rPr>
                         <a:t>Wednesday</a:t>
                       </a:r>
-                      <a:endParaRPr lang="en-US" sz="1600">
-                        <a:effectLst/>
-                        <a:latin typeface="Calibri" panose="020F0502020204030204" pitchFamily="34" charset="0"/>
-                        <a:ea typeface="Calibri" panose="020F0502020204030204" pitchFamily="34" charset="0"/>
-                        <a:cs typeface="Times New Roman" panose="02020603050405020304" pitchFamily="18" charset="0"/>
-                      </a:endParaRPr>
                     </a:p>
                   </a:txBody>
-                  <a:tcPr marL="15875" marR="15875" marT="15875" marB="15875" anchor="ctr">
-                    <a:lnL w="12700" cap="flat" cmpd="sng" algn="ctr">
+                  <a:tcPr marL="15681" marR="15681" marT="15681" marB="15681" anchor="ctr">
+                    <a:lnL w="6350" cap="flat" cmpd="sng" algn="ctr">
                       <a:solidFill>
-                        <a:schemeClr val="tx1"/>
+                        <a:srgbClr val="E0E0E0"/>
                       </a:solidFill>
                       <a:prstDash val="solid"/>
                       <a:round/>
                       <a:headEnd type="none" w="med" len="med"/>
                       <a:tailEnd type="none" w="med" len="med"/>
                     </a:lnL>
-                    <a:lnR w="12700" cap="flat" cmpd="sng" algn="ctr">
+                    <a:lnR w="6350" cap="flat" cmpd="sng" algn="ctr">
                       <a:solidFill>
-                        <a:schemeClr val="tx1"/>
+                        <a:srgbClr val="E0E0E0"/>
                       </a:solidFill>
                       <a:prstDash val="solid"/>
                       <a:round/>
                       <a:headEnd type="none" w="med" len="med"/>
                       <a:tailEnd type="none" w="med" len="med"/>
                     </a:lnR>
-                    <a:lnT w="12700" cap="flat" cmpd="sng" algn="ctr">
+                    <a:lnT w="6350" cap="flat" cmpd="sng" algn="ctr">
                       <a:solidFill>
-                        <a:schemeClr val="tx1"/>
+                        <a:srgbClr val="E0E0E0"/>
                       </a:solidFill>
                       <a:prstDash val="solid"/>
                       <a:round/>
                       <a:headEnd type="none" w="med" len="med"/>
                       <a:tailEnd type="none" w="med" len="med"/>
                     </a:lnT>
-                    <a:lnB w="12700" cap="flat" cmpd="sng" algn="ctr">
+                    <a:lnB w="6350" cap="flat" cmpd="sng" algn="ctr">
                       <a:solidFill>
-                        <a:schemeClr val="tx1"/>
+                        <a:srgbClr val="E0E0E0"/>
                       </a:solidFill>
                       <a:prstDash val="solid"/>
                       <a:round/>
                       <a:headEnd type="none" w="med" len="med"/>
                       <a:tailEnd type="none" w="med" len="med"/>
                     </a:lnB>
-                    <a:lnTlToBr w="12700" cmpd="sng">
-                      <a:noFill/>
-                      <a:prstDash val="solid"/>
-                    </a:lnTlToBr>
-                    <a:lnBlToTr w="12700" cmpd="sng">
-                      <a:noFill/>
-                      <a:prstDash val="solid"/>
-                    </a:lnBlToTr>
                     <a:solidFill>
-                      <a:schemeClr val="bg1"/>
+                      <a:srgbClr val="FFFFFF"/>
                     </a:solidFill>
                   </a:tcPr>
                 </a:tc>
@@ -17817,165 +17660,115 @@
                     <a:bodyPr/>
                     <a:lstStyle/>
                     <a:p>
-                      <a:pPr marL="0" marR="0">
-                        <a:lnSpc>
-                          <a:spcPct val="107000"/>
-                        </a:lnSpc>
-                        <a:spcBef>
-                          <a:spcPts val="0"/>
-                        </a:spcBef>
-                        <a:spcAft>
-                          <a:spcPts val="800"/>
-                        </a:spcAft>
-                      </a:pPr>
                       <a:r>
-                        <a:rPr lang="en-US" sz="1600">
+                        <a:rPr lang="en-US" sz="1700">
                           <a:effectLst/>
                         </a:rPr>
                         <a:t>3 PM - 5 PM : CSB 120</a:t>
                       </a:r>
-                      <a:endParaRPr lang="en-US" sz="1600">
-                        <a:effectLst/>
-                        <a:latin typeface="Calibri" panose="020F0502020204030204" pitchFamily="34" charset="0"/>
-                        <a:ea typeface="Calibri" panose="020F0502020204030204" pitchFamily="34" charset="0"/>
-                        <a:cs typeface="Times New Roman" panose="02020603050405020304" pitchFamily="18" charset="0"/>
-                      </a:endParaRPr>
                     </a:p>
                   </a:txBody>
-                  <a:tcPr marL="15875" marR="15875" marT="15875" marB="15875" anchor="ctr">
-                    <a:lnL w="12700" cap="flat" cmpd="sng" algn="ctr">
+                  <a:tcPr marL="15681" marR="15681" marT="15681" marB="15681" anchor="ctr">
+                    <a:lnL w="6350" cap="flat" cmpd="sng" algn="ctr">
                       <a:solidFill>
-                        <a:schemeClr val="tx1"/>
+                        <a:srgbClr val="E0E0E0"/>
                       </a:solidFill>
                       <a:prstDash val="solid"/>
                       <a:round/>
                       <a:headEnd type="none" w="med" len="med"/>
                       <a:tailEnd type="none" w="med" len="med"/>
                     </a:lnL>
-                    <a:lnR w="12700" cap="flat" cmpd="sng" algn="ctr">
+                    <a:lnR w="6350" cap="flat" cmpd="sng" algn="ctr">
                       <a:solidFill>
-                        <a:schemeClr val="tx1"/>
+                        <a:srgbClr val="E0E0E0"/>
                       </a:solidFill>
                       <a:prstDash val="solid"/>
                       <a:round/>
                       <a:headEnd type="none" w="med" len="med"/>
                       <a:tailEnd type="none" w="med" len="med"/>
                     </a:lnR>
-                    <a:lnT w="12700" cap="flat" cmpd="sng" algn="ctr">
+                    <a:lnT w="6350" cap="flat" cmpd="sng" algn="ctr">
                       <a:solidFill>
-                        <a:schemeClr val="tx1"/>
+                        <a:srgbClr val="E0E0E0"/>
                       </a:solidFill>
                       <a:prstDash val="solid"/>
                       <a:round/>
                       <a:headEnd type="none" w="med" len="med"/>
                       <a:tailEnd type="none" w="med" len="med"/>
                     </a:lnT>
-                    <a:lnB w="12700" cap="flat" cmpd="sng" algn="ctr">
+                    <a:lnB w="6350" cap="flat" cmpd="sng" algn="ctr">
                       <a:solidFill>
-                        <a:schemeClr val="tx1"/>
+                        <a:srgbClr val="E0E0E0"/>
                       </a:solidFill>
                       <a:prstDash val="solid"/>
                       <a:round/>
                       <a:headEnd type="none" w="med" len="med"/>
                       <a:tailEnd type="none" w="med" len="med"/>
                     </a:lnB>
-                    <a:lnTlToBr w="12700" cmpd="sng">
-                      <a:noFill/>
-                      <a:prstDash val="solid"/>
-                    </a:lnTlToBr>
-                    <a:lnBlToTr w="12700" cmpd="sng">
-                      <a:noFill/>
-                      <a:prstDash val="solid"/>
-                    </a:lnBlToTr>
                     <a:solidFill>
-                      <a:schemeClr val="bg1"/>
+                      <a:srgbClr val="FFFFFF"/>
                     </a:solidFill>
                   </a:tcPr>
                 </a:tc>
                 <a:extLst>
                   <a:ext uri="{0D108BD9-81ED-4DB2-BD59-A6C34878D82A}">
-                    <a16:rowId xmlns:a16="http://schemas.microsoft.com/office/drawing/2014/main" val="1097778555"/>
+                    <a16:rowId xmlns:a16="http://schemas.microsoft.com/office/drawing/2014/main" val="252902362"/>
                   </a:ext>
                 </a:extLst>
               </a:tr>
-              <a:tr h="307347">
+              <a:tr h="289830">
                 <a:tc>
                   <a:txBody>
                     <a:bodyPr/>
                     <a:lstStyle/>
                     <a:p>
-                      <a:pPr marL="0" marR="0">
-                        <a:lnSpc>
-                          <a:spcPct val="107000"/>
-                        </a:lnSpc>
-                        <a:spcBef>
-                          <a:spcPts val="0"/>
-                        </a:spcBef>
-                        <a:spcAft>
-                          <a:spcPts val="800"/>
-                        </a:spcAft>
-                      </a:pPr>
                       <a:r>
-                        <a:rPr lang="en-US" sz="1600">
+                        <a:rPr lang="en-US" sz="1700">
                           <a:effectLst/>
                         </a:rPr>
                         <a:t>Thursday</a:t>
                       </a:r>
-                      <a:endParaRPr lang="en-US" sz="1600">
-                        <a:effectLst/>
-                        <a:latin typeface="Calibri" panose="020F0502020204030204" pitchFamily="34" charset="0"/>
-                        <a:ea typeface="Calibri" panose="020F0502020204030204" pitchFamily="34" charset="0"/>
-                        <a:cs typeface="Times New Roman" panose="02020603050405020304" pitchFamily="18" charset="0"/>
-                      </a:endParaRPr>
                     </a:p>
                   </a:txBody>
-                  <a:tcPr marL="15875" marR="15875" marT="15875" marB="15875" anchor="ctr">
-                    <a:lnL w="12700" cap="flat" cmpd="sng" algn="ctr">
+                  <a:tcPr marL="15681" marR="15681" marT="15681" marB="15681" anchor="ctr">
+                    <a:lnL w="6350" cap="flat" cmpd="sng" algn="ctr">
                       <a:solidFill>
-                        <a:schemeClr val="tx1"/>
+                        <a:srgbClr val="E0E0E0"/>
                       </a:solidFill>
                       <a:prstDash val="solid"/>
                       <a:round/>
                       <a:headEnd type="none" w="med" len="med"/>
                       <a:tailEnd type="none" w="med" len="med"/>
                     </a:lnL>
-                    <a:lnR w="12700" cap="flat" cmpd="sng" algn="ctr">
+                    <a:lnR w="6350" cap="flat" cmpd="sng" algn="ctr">
                       <a:solidFill>
-                        <a:schemeClr val="tx1"/>
+                        <a:srgbClr val="E0E0E0"/>
                       </a:solidFill>
                       <a:prstDash val="solid"/>
                       <a:round/>
                       <a:headEnd type="none" w="med" len="med"/>
                       <a:tailEnd type="none" w="med" len="med"/>
                     </a:lnR>
-                    <a:lnT w="12700" cap="flat" cmpd="sng" algn="ctr">
+                    <a:lnT w="6350" cap="flat" cmpd="sng" algn="ctr">
                       <a:solidFill>
-                        <a:schemeClr val="tx1"/>
+                        <a:srgbClr val="E0E0E0"/>
                       </a:solidFill>
                       <a:prstDash val="solid"/>
                       <a:round/>
                       <a:headEnd type="none" w="med" len="med"/>
                       <a:tailEnd type="none" w="med" len="med"/>
                     </a:lnT>
-                    <a:lnB w="12700" cap="flat" cmpd="sng" algn="ctr">
+                    <a:lnB w="6350" cap="flat" cmpd="sng" algn="ctr">
                       <a:solidFill>
-                        <a:schemeClr val="tx1"/>
+                        <a:srgbClr val="E0E0E0"/>
                       </a:solidFill>
                       <a:prstDash val="solid"/>
                       <a:round/>
                       <a:headEnd type="none" w="med" len="med"/>
                       <a:tailEnd type="none" w="med" len="med"/>
                     </a:lnB>
-                    <a:lnTlToBr w="12700" cmpd="sng">
-                      <a:noFill/>
-                      <a:prstDash val="solid"/>
-                    </a:lnTlToBr>
-                    <a:lnBlToTr w="12700" cmpd="sng">
-                      <a:noFill/>
-                      <a:prstDash val="solid"/>
-                    </a:lnBlToTr>
                     <a:solidFill>
-                      <a:schemeClr val="bg1"/>
+                      <a:srgbClr val="FFFFFF"/>
                     </a:solidFill>
                   </a:tcPr>
                 </a:tc>
@@ -17984,165 +17777,115 @@
                     <a:bodyPr/>
                     <a:lstStyle/>
                     <a:p>
-                      <a:pPr marL="0" marR="0">
-                        <a:lnSpc>
-                          <a:spcPct val="107000"/>
-                        </a:lnSpc>
-                        <a:spcBef>
-                          <a:spcPts val="0"/>
-                        </a:spcBef>
-                        <a:spcAft>
-                          <a:spcPts val="800"/>
-                        </a:spcAft>
-                      </a:pPr>
                       <a:r>
-                        <a:rPr lang="en-US" sz="1600">
+                        <a:rPr lang="en-US" sz="1700">
                           <a:effectLst/>
                         </a:rPr>
                         <a:t>6 PM - 8 PM : Teams</a:t>
                       </a:r>
-                      <a:endParaRPr lang="en-US" sz="1600">
-                        <a:effectLst/>
-                        <a:latin typeface="Calibri" panose="020F0502020204030204" pitchFamily="34" charset="0"/>
-                        <a:ea typeface="Calibri" panose="020F0502020204030204" pitchFamily="34" charset="0"/>
-                        <a:cs typeface="Times New Roman" panose="02020603050405020304" pitchFamily="18" charset="0"/>
-                      </a:endParaRPr>
                     </a:p>
                   </a:txBody>
-                  <a:tcPr marL="15875" marR="15875" marT="15875" marB="15875" anchor="ctr">
-                    <a:lnL w="12700" cap="flat" cmpd="sng" algn="ctr">
+                  <a:tcPr marL="15681" marR="15681" marT="15681" marB="15681" anchor="ctr">
+                    <a:lnL w="6350" cap="flat" cmpd="sng" algn="ctr">
                       <a:solidFill>
-                        <a:schemeClr val="tx1"/>
+                        <a:srgbClr val="E0E0E0"/>
                       </a:solidFill>
                       <a:prstDash val="solid"/>
                       <a:round/>
                       <a:headEnd type="none" w="med" len="med"/>
                       <a:tailEnd type="none" w="med" len="med"/>
                     </a:lnL>
-                    <a:lnR w="12700" cap="flat" cmpd="sng" algn="ctr">
+                    <a:lnR w="6350" cap="flat" cmpd="sng" algn="ctr">
                       <a:solidFill>
-                        <a:schemeClr val="tx1"/>
+                        <a:srgbClr val="E0E0E0"/>
                       </a:solidFill>
                       <a:prstDash val="solid"/>
                       <a:round/>
                       <a:headEnd type="none" w="med" len="med"/>
                       <a:tailEnd type="none" w="med" len="med"/>
                     </a:lnR>
-                    <a:lnT w="12700" cap="flat" cmpd="sng" algn="ctr">
+                    <a:lnT w="6350" cap="flat" cmpd="sng" algn="ctr">
                       <a:solidFill>
-                        <a:schemeClr val="tx1"/>
+                        <a:srgbClr val="E0E0E0"/>
                       </a:solidFill>
                       <a:prstDash val="solid"/>
                       <a:round/>
                       <a:headEnd type="none" w="med" len="med"/>
                       <a:tailEnd type="none" w="med" len="med"/>
                     </a:lnT>
-                    <a:lnB w="12700" cap="flat" cmpd="sng" algn="ctr">
+                    <a:lnB w="6350" cap="flat" cmpd="sng" algn="ctr">
                       <a:solidFill>
-                        <a:schemeClr val="tx1"/>
+                        <a:srgbClr val="E0E0E0"/>
                       </a:solidFill>
                       <a:prstDash val="solid"/>
                       <a:round/>
                       <a:headEnd type="none" w="med" len="med"/>
                       <a:tailEnd type="none" w="med" len="med"/>
                     </a:lnB>
-                    <a:lnTlToBr w="12700" cmpd="sng">
-                      <a:noFill/>
-                      <a:prstDash val="solid"/>
-                    </a:lnTlToBr>
-                    <a:lnBlToTr w="12700" cmpd="sng">
-                      <a:noFill/>
-                      <a:prstDash val="solid"/>
-                    </a:lnBlToTr>
                     <a:solidFill>
-                      <a:schemeClr val="bg1"/>
+                      <a:srgbClr val="FFFFFF"/>
                     </a:solidFill>
                   </a:tcPr>
                 </a:tc>
                 <a:extLst>
                   <a:ext uri="{0D108BD9-81ED-4DB2-BD59-A6C34878D82A}">
-                    <a16:rowId xmlns:a16="http://schemas.microsoft.com/office/drawing/2014/main" val="1747960062"/>
+                    <a16:rowId xmlns:a16="http://schemas.microsoft.com/office/drawing/2014/main" val="2125508035"/>
                   </a:ext>
                 </a:extLst>
               </a:tr>
-              <a:tr h="581669">
+              <a:tr h="548296">
                 <a:tc>
                   <a:txBody>
                     <a:bodyPr/>
                     <a:lstStyle/>
                     <a:p>
-                      <a:pPr marL="0" marR="0">
-                        <a:lnSpc>
-                          <a:spcPct val="107000"/>
-                        </a:lnSpc>
-                        <a:spcBef>
-                          <a:spcPts val="0"/>
-                        </a:spcBef>
-                        <a:spcAft>
-                          <a:spcPts val="800"/>
-                        </a:spcAft>
-                      </a:pPr>
                       <a:r>
-                        <a:rPr lang="en-US" sz="1600">
+                        <a:rPr lang="en-US" sz="1700">
                           <a:effectLst/>
                         </a:rPr>
                         <a:t>Friday</a:t>
                       </a:r>
-                      <a:endParaRPr lang="en-US" sz="1600">
-                        <a:effectLst/>
-                        <a:latin typeface="Calibri" panose="020F0502020204030204" pitchFamily="34" charset="0"/>
-                        <a:ea typeface="Calibri" panose="020F0502020204030204" pitchFamily="34" charset="0"/>
-                        <a:cs typeface="Times New Roman" panose="02020603050405020304" pitchFamily="18" charset="0"/>
-                      </a:endParaRPr>
                     </a:p>
                   </a:txBody>
-                  <a:tcPr marL="15875" marR="15875" marT="15875" marB="15875" anchor="ctr">
-                    <a:lnL w="12700" cap="flat" cmpd="sng" algn="ctr">
+                  <a:tcPr marL="15681" marR="15681" marT="15681" marB="15681" anchor="ctr">
+                    <a:lnL w="6350" cap="flat" cmpd="sng" algn="ctr">
                       <a:solidFill>
-                        <a:schemeClr val="tx1"/>
+                        <a:srgbClr val="E0E0E0"/>
                       </a:solidFill>
                       <a:prstDash val="solid"/>
                       <a:round/>
                       <a:headEnd type="none" w="med" len="med"/>
                       <a:tailEnd type="none" w="med" len="med"/>
                     </a:lnL>
-                    <a:lnR w="12700" cap="flat" cmpd="sng" algn="ctr">
+                    <a:lnR w="6350" cap="flat" cmpd="sng" algn="ctr">
                       <a:solidFill>
-                        <a:schemeClr val="tx1"/>
+                        <a:srgbClr val="E0E0E0"/>
                       </a:solidFill>
                       <a:prstDash val="solid"/>
                       <a:round/>
                       <a:headEnd type="none" w="med" len="med"/>
                       <a:tailEnd type="none" w="med" len="med"/>
                     </a:lnR>
-                    <a:lnT w="12700" cap="flat" cmpd="sng" algn="ctr">
+                    <a:lnT w="6350" cap="flat" cmpd="sng" algn="ctr">
                       <a:solidFill>
-                        <a:schemeClr val="tx1"/>
+                        <a:srgbClr val="E0E0E0"/>
                       </a:solidFill>
                       <a:prstDash val="solid"/>
                       <a:round/>
                       <a:headEnd type="none" w="med" len="med"/>
                       <a:tailEnd type="none" w="med" len="med"/>
                     </a:lnT>
-                    <a:lnB w="12700" cap="flat" cmpd="sng" algn="ctr">
+                    <a:lnB w="6350" cap="flat" cmpd="sng" algn="ctr">
                       <a:solidFill>
-                        <a:schemeClr val="tx1"/>
+                        <a:srgbClr val="E0E0E0"/>
                       </a:solidFill>
                       <a:prstDash val="solid"/>
                       <a:round/>
                       <a:headEnd type="none" w="med" len="med"/>
                       <a:tailEnd type="none" w="med" len="med"/>
                     </a:lnB>
-                    <a:lnTlToBr w="12700" cmpd="sng">
-                      <a:noFill/>
-                      <a:prstDash val="solid"/>
-                    </a:lnTlToBr>
-                    <a:lnBlToTr w="12700" cmpd="sng">
-                      <a:noFill/>
-                      <a:prstDash val="solid"/>
-                    </a:lnBlToTr>
                     <a:solidFill>
-                      <a:schemeClr val="bg1"/>
+                      <a:srgbClr val="FFFFFF"/>
                     </a:solidFill>
                   </a:tcPr>
                 </a:tc>
@@ -18151,165 +17894,115 @@
                     <a:bodyPr/>
                     <a:lstStyle/>
                     <a:p>
-                      <a:pPr marL="0" marR="0">
-                        <a:lnSpc>
-                          <a:spcPct val="107000"/>
-                        </a:lnSpc>
-                        <a:spcBef>
-                          <a:spcPts val="0"/>
-                        </a:spcBef>
-                        <a:spcAft>
-                          <a:spcPts val="800"/>
-                        </a:spcAft>
-                      </a:pPr>
                       <a:r>
-                        <a:rPr lang="en-US" sz="1600">
+                        <a:rPr lang="en-US" sz="1700">
                           <a:effectLst/>
                         </a:rPr>
                         <a:t>3 PM - 5 PM : CSB 120</a:t>
                       </a:r>
-                      <a:endParaRPr lang="en-US" sz="1600">
-                        <a:effectLst/>
-                        <a:latin typeface="Calibri" panose="020F0502020204030204" pitchFamily="34" charset="0"/>
-                        <a:ea typeface="Calibri" panose="020F0502020204030204" pitchFamily="34" charset="0"/>
-                        <a:cs typeface="Times New Roman" panose="02020603050405020304" pitchFamily="18" charset="0"/>
-                      </a:endParaRPr>
                     </a:p>
                   </a:txBody>
-                  <a:tcPr marL="15875" marR="15875" marT="15875" marB="15875" anchor="ctr">
-                    <a:lnL w="12700" cap="flat" cmpd="sng" algn="ctr">
+                  <a:tcPr marL="15681" marR="15681" marT="15681" marB="15681" anchor="ctr">
+                    <a:lnL w="6350" cap="flat" cmpd="sng" algn="ctr">
                       <a:solidFill>
-                        <a:schemeClr val="tx1"/>
+                        <a:srgbClr val="E0E0E0"/>
                       </a:solidFill>
                       <a:prstDash val="solid"/>
                       <a:round/>
                       <a:headEnd type="none" w="med" len="med"/>
                       <a:tailEnd type="none" w="med" len="med"/>
                     </a:lnL>
-                    <a:lnR w="12700" cap="flat" cmpd="sng" algn="ctr">
+                    <a:lnR w="6350" cap="flat" cmpd="sng" algn="ctr">
                       <a:solidFill>
-                        <a:schemeClr val="tx1"/>
+                        <a:srgbClr val="E0E0E0"/>
                       </a:solidFill>
                       <a:prstDash val="solid"/>
                       <a:round/>
                       <a:headEnd type="none" w="med" len="med"/>
                       <a:tailEnd type="none" w="med" len="med"/>
                     </a:lnR>
-                    <a:lnT w="12700" cap="flat" cmpd="sng" algn="ctr">
+                    <a:lnT w="6350" cap="flat" cmpd="sng" algn="ctr">
                       <a:solidFill>
-                        <a:schemeClr val="tx1"/>
+                        <a:srgbClr val="E0E0E0"/>
                       </a:solidFill>
                       <a:prstDash val="solid"/>
                       <a:round/>
                       <a:headEnd type="none" w="med" len="med"/>
                       <a:tailEnd type="none" w="med" len="med"/>
                     </a:lnT>
-                    <a:lnB w="12700" cap="flat" cmpd="sng" algn="ctr">
+                    <a:lnB w="6350" cap="flat" cmpd="sng" algn="ctr">
                       <a:solidFill>
-                        <a:schemeClr val="tx1"/>
+                        <a:srgbClr val="E0E0E0"/>
                       </a:solidFill>
                       <a:prstDash val="solid"/>
                       <a:round/>
                       <a:headEnd type="none" w="med" len="med"/>
                       <a:tailEnd type="none" w="med" len="med"/>
                     </a:lnB>
-                    <a:lnTlToBr w="12700" cmpd="sng">
-                      <a:noFill/>
-                      <a:prstDash val="solid"/>
-                    </a:lnTlToBr>
-                    <a:lnBlToTr w="12700" cmpd="sng">
-                      <a:noFill/>
-                      <a:prstDash val="solid"/>
-                    </a:lnBlToTr>
                     <a:solidFill>
-                      <a:schemeClr val="bg1"/>
+                      <a:srgbClr val="FFFFFF"/>
                     </a:solidFill>
                   </a:tcPr>
                 </a:tc>
                 <a:extLst>
                   <a:ext uri="{0D108BD9-81ED-4DB2-BD59-A6C34878D82A}">
-                    <a16:rowId xmlns:a16="http://schemas.microsoft.com/office/drawing/2014/main" val="1553865624"/>
+                    <a16:rowId xmlns:a16="http://schemas.microsoft.com/office/drawing/2014/main" val="772220127"/>
                   </a:ext>
                 </a:extLst>
               </a:tr>
-              <a:tr h="307347">
+              <a:tr h="289830">
                 <a:tc>
                   <a:txBody>
                     <a:bodyPr/>
                     <a:lstStyle/>
                     <a:p>
-                      <a:pPr marL="0" marR="0">
-                        <a:lnSpc>
-                          <a:spcPct val="107000"/>
-                        </a:lnSpc>
-                        <a:spcBef>
-                          <a:spcPts val="0"/>
-                        </a:spcBef>
-                        <a:spcAft>
-                          <a:spcPts val="800"/>
-                        </a:spcAft>
-                      </a:pPr>
                       <a:r>
-                        <a:rPr lang="en-US" sz="1600">
+                        <a:rPr lang="en-US" sz="1700">
                           <a:effectLst/>
                         </a:rPr>
                         <a:t>Saturday</a:t>
                       </a:r>
-                      <a:endParaRPr lang="en-US" sz="1600">
-                        <a:effectLst/>
-                        <a:latin typeface="Calibri" panose="020F0502020204030204" pitchFamily="34" charset="0"/>
-                        <a:ea typeface="Calibri" panose="020F0502020204030204" pitchFamily="34" charset="0"/>
-                        <a:cs typeface="Times New Roman" panose="02020603050405020304" pitchFamily="18" charset="0"/>
-                      </a:endParaRPr>
                     </a:p>
                   </a:txBody>
-                  <a:tcPr marL="15875" marR="15875" marT="15875" marB="15875" anchor="ctr">
-                    <a:lnL w="12700" cap="flat" cmpd="sng" algn="ctr">
+                  <a:tcPr marL="15681" marR="15681" marT="15681" marB="15681" anchor="ctr">
+                    <a:lnL w="6350" cap="flat" cmpd="sng" algn="ctr">
                       <a:solidFill>
-                        <a:schemeClr val="tx1"/>
+                        <a:srgbClr val="E0E0E0"/>
                       </a:solidFill>
                       <a:prstDash val="solid"/>
                       <a:round/>
                       <a:headEnd type="none" w="med" len="med"/>
                       <a:tailEnd type="none" w="med" len="med"/>
                     </a:lnL>
-                    <a:lnR w="12700" cap="flat" cmpd="sng" algn="ctr">
+                    <a:lnR w="6350" cap="flat" cmpd="sng" algn="ctr">
                       <a:solidFill>
-                        <a:schemeClr val="tx1"/>
+                        <a:srgbClr val="E0E0E0"/>
                       </a:solidFill>
                       <a:prstDash val="solid"/>
                       <a:round/>
                       <a:headEnd type="none" w="med" len="med"/>
                       <a:tailEnd type="none" w="med" len="med"/>
                     </a:lnR>
-                    <a:lnT w="12700" cap="flat" cmpd="sng" algn="ctr">
+                    <a:lnT w="6350" cap="flat" cmpd="sng" algn="ctr">
                       <a:solidFill>
-                        <a:schemeClr val="tx1"/>
+                        <a:srgbClr val="E0E0E0"/>
                       </a:solidFill>
                       <a:prstDash val="solid"/>
                       <a:round/>
                       <a:headEnd type="none" w="med" len="med"/>
                       <a:tailEnd type="none" w="med" len="med"/>
                     </a:lnT>
-                    <a:lnB w="12700" cap="flat" cmpd="sng" algn="ctr">
+                    <a:lnB w="6350" cap="flat" cmpd="sng" algn="ctr">
                       <a:solidFill>
-                        <a:schemeClr val="tx1"/>
+                        <a:srgbClr val="E0E0E0"/>
                       </a:solidFill>
                       <a:prstDash val="solid"/>
                       <a:round/>
                       <a:headEnd type="none" w="med" len="med"/>
                       <a:tailEnd type="none" w="med" len="med"/>
                     </a:lnB>
-                    <a:lnTlToBr w="12700" cmpd="sng">
-                      <a:noFill/>
-                      <a:prstDash val="solid"/>
-                    </a:lnTlToBr>
-                    <a:lnBlToTr w="12700" cmpd="sng">
-                      <a:noFill/>
-                      <a:prstDash val="solid"/>
-                    </a:lnBlToTr>
                     <a:solidFill>
-                      <a:schemeClr val="bg1"/>
+                      <a:srgbClr val="FFFFFF"/>
                     </a:solidFill>
                   </a:tcPr>
                 </a:tc>
@@ -18318,165 +18011,115 @@
                     <a:bodyPr/>
                     <a:lstStyle/>
                     <a:p>
-                      <a:pPr marL="0" marR="0">
-                        <a:lnSpc>
-                          <a:spcPct val="107000"/>
-                        </a:lnSpc>
-                        <a:spcBef>
-                          <a:spcPts val="0"/>
-                        </a:spcBef>
-                        <a:spcAft>
-                          <a:spcPts val="800"/>
-                        </a:spcAft>
-                      </a:pPr>
                       <a:r>
-                        <a:rPr lang="en-US" sz="1600" dirty="0">
+                        <a:rPr lang="en-US" sz="1700">
                           <a:effectLst/>
                         </a:rPr>
                         <a:t>12 PM - 4 PM : Teams</a:t>
                       </a:r>
-                      <a:endParaRPr lang="en-US" sz="1600" dirty="0">
-                        <a:effectLst/>
-                        <a:latin typeface="Calibri" panose="020F0502020204030204" pitchFamily="34" charset="0"/>
-                        <a:ea typeface="Calibri" panose="020F0502020204030204" pitchFamily="34" charset="0"/>
-                        <a:cs typeface="Times New Roman" panose="02020603050405020304" pitchFamily="18" charset="0"/>
-                      </a:endParaRPr>
                     </a:p>
                   </a:txBody>
-                  <a:tcPr marL="15875" marR="15875" marT="15875" marB="15875" anchor="ctr">
-                    <a:lnL w="12700" cap="flat" cmpd="sng" algn="ctr">
+                  <a:tcPr marL="15681" marR="15681" marT="15681" marB="15681" anchor="ctr">
+                    <a:lnL w="6350" cap="flat" cmpd="sng" algn="ctr">
                       <a:solidFill>
-                        <a:schemeClr val="tx1"/>
+                        <a:srgbClr val="E0E0E0"/>
                       </a:solidFill>
                       <a:prstDash val="solid"/>
                       <a:round/>
                       <a:headEnd type="none" w="med" len="med"/>
                       <a:tailEnd type="none" w="med" len="med"/>
                     </a:lnL>
-                    <a:lnR w="12700" cap="flat" cmpd="sng" algn="ctr">
+                    <a:lnR w="6350" cap="flat" cmpd="sng" algn="ctr">
                       <a:solidFill>
-                        <a:schemeClr val="tx1"/>
+                        <a:srgbClr val="E0E0E0"/>
                       </a:solidFill>
                       <a:prstDash val="solid"/>
                       <a:round/>
                       <a:headEnd type="none" w="med" len="med"/>
                       <a:tailEnd type="none" w="med" len="med"/>
                     </a:lnR>
-                    <a:lnT w="12700" cap="flat" cmpd="sng" algn="ctr">
+                    <a:lnT w="6350" cap="flat" cmpd="sng" algn="ctr">
                       <a:solidFill>
-                        <a:schemeClr val="tx1"/>
+                        <a:srgbClr val="E0E0E0"/>
                       </a:solidFill>
                       <a:prstDash val="solid"/>
                       <a:round/>
                       <a:headEnd type="none" w="med" len="med"/>
                       <a:tailEnd type="none" w="med" len="med"/>
                     </a:lnT>
-                    <a:lnB w="12700" cap="flat" cmpd="sng" algn="ctr">
+                    <a:lnB w="6350" cap="flat" cmpd="sng" algn="ctr">
                       <a:solidFill>
-                        <a:schemeClr val="tx1"/>
+                        <a:srgbClr val="E0E0E0"/>
                       </a:solidFill>
                       <a:prstDash val="solid"/>
                       <a:round/>
                       <a:headEnd type="none" w="med" len="med"/>
                       <a:tailEnd type="none" w="med" len="med"/>
                     </a:lnB>
-                    <a:lnTlToBr w="12700" cmpd="sng">
-                      <a:noFill/>
-                      <a:prstDash val="solid"/>
-                    </a:lnTlToBr>
-                    <a:lnBlToTr w="12700" cmpd="sng">
-                      <a:noFill/>
-                      <a:prstDash val="solid"/>
-                    </a:lnBlToTr>
                     <a:solidFill>
-                      <a:schemeClr val="bg1"/>
+                      <a:srgbClr val="FFFFFF"/>
                     </a:solidFill>
                   </a:tcPr>
                 </a:tc>
                 <a:extLst>
                   <a:ext uri="{0D108BD9-81ED-4DB2-BD59-A6C34878D82A}">
-                    <a16:rowId xmlns:a16="http://schemas.microsoft.com/office/drawing/2014/main" val="3921746368"/>
+                    <a16:rowId xmlns:a16="http://schemas.microsoft.com/office/drawing/2014/main" val="3754499503"/>
                   </a:ext>
                 </a:extLst>
               </a:tr>
-              <a:tr h="307347">
+              <a:tr h="289830">
                 <a:tc>
                   <a:txBody>
                     <a:bodyPr/>
                     <a:lstStyle/>
                     <a:p>
-                      <a:pPr marL="0" marR="0">
-                        <a:lnSpc>
-                          <a:spcPct val="107000"/>
-                        </a:lnSpc>
-                        <a:spcBef>
-                          <a:spcPts val="0"/>
-                        </a:spcBef>
-                        <a:spcAft>
-                          <a:spcPts val="800"/>
-                        </a:spcAft>
-                      </a:pPr>
                       <a:r>
-                        <a:rPr lang="en-US" sz="1600">
+                        <a:rPr lang="en-US" sz="1700">
                           <a:effectLst/>
                         </a:rPr>
                         <a:t>Sunday</a:t>
                       </a:r>
-                      <a:endParaRPr lang="en-US" sz="1600">
-                        <a:effectLst/>
-                        <a:latin typeface="Calibri" panose="020F0502020204030204" pitchFamily="34" charset="0"/>
-                        <a:ea typeface="Calibri" panose="020F0502020204030204" pitchFamily="34" charset="0"/>
-                        <a:cs typeface="Times New Roman" panose="02020603050405020304" pitchFamily="18" charset="0"/>
-                      </a:endParaRPr>
                     </a:p>
                   </a:txBody>
-                  <a:tcPr marL="15875" marR="15875" marT="15875" marB="15875" anchor="ctr">
-                    <a:lnL w="12700" cap="flat" cmpd="sng" algn="ctr">
+                  <a:tcPr marL="15681" marR="15681" marT="15681" marB="15681" anchor="ctr">
+                    <a:lnL w="6350" cap="flat" cmpd="sng" algn="ctr">
                       <a:solidFill>
-                        <a:schemeClr val="tx1"/>
+                        <a:srgbClr val="E0E0E0"/>
                       </a:solidFill>
                       <a:prstDash val="solid"/>
                       <a:round/>
                       <a:headEnd type="none" w="med" len="med"/>
                       <a:tailEnd type="none" w="med" len="med"/>
                     </a:lnL>
-                    <a:lnR w="12700" cap="flat" cmpd="sng" algn="ctr">
+                    <a:lnR w="6350" cap="flat" cmpd="sng" algn="ctr">
                       <a:solidFill>
-                        <a:schemeClr val="tx1"/>
+                        <a:srgbClr val="E0E0E0"/>
                       </a:solidFill>
                       <a:prstDash val="solid"/>
                       <a:round/>
                       <a:headEnd type="none" w="med" len="med"/>
                       <a:tailEnd type="none" w="med" len="med"/>
                     </a:lnR>
-                    <a:lnT w="12700" cap="flat" cmpd="sng" algn="ctr">
+                    <a:lnT w="6350" cap="flat" cmpd="sng" algn="ctr">
                       <a:solidFill>
-                        <a:schemeClr val="tx1"/>
+                        <a:srgbClr val="E0E0E0"/>
                       </a:solidFill>
                       <a:prstDash val="solid"/>
                       <a:round/>
                       <a:headEnd type="none" w="med" len="med"/>
                       <a:tailEnd type="none" w="med" len="med"/>
                     </a:lnT>
-                    <a:lnB w="12700" cap="flat" cmpd="sng" algn="ctr">
+                    <a:lnB w="6350" cap="flat" cmpd="sng" algn="ctr">
                       <a:solidFill>
-                        <a:schemeClr val="tx1"/>
+                        <a:srgbClr val="E0E0E0"/>
                       </a:solidFill>
                       <a:prstDash val="solid"/>
                       <a:round/>
                       <a:headEnd type="none" w="med" len="med"/>
                       <a:tailEnd type="none" w="med" len="med"/>
                     </a:lnB>
-                    <a:lnTlToBr w="12700" cmpd="sng">
-                      <a:noFill/>
-                      <a:prstDash val="solid"/>
-                    </a:lnTlToBr>
-                    <a:lnBlToTr w="12700" cmpd="sng">
-                      <a:noFill/>
-                      <a:prstDash val="solid"/>
-                    </a:lnBlToTr>
                     <a:solidFill>
-                      <a:schemeClr val="bg1"/>
+                      <a:srgbClr val="FFFFFF"/>
                     </a:solidFill>
                   </a:tcPr>
                 </a:tc>
@@ -18485,84 +18128,59 @@
                     <a:bodyPr/>
                     <a:lstStyle/>
                     <a:p>
-                      <a:pPr marL="0" marR="0">
-                        <a:lnSpc>
-                          <a:spcPct val="107000"/>
-                        </a:lnSpc>
-                        <a:spcBef>
-                          <a:spcPts val="0"/>
-                        </a:spcBef>
-                        <a:spcAft>
-                          <a:spcPts val="800"/>
-                        </a:spcAft>
-                      </a:pPr>
                       <a:r>
-                        <a:rPr lang="en-US" sz="1600" dirty="0">
+                        <a:rPr lang="en-US" sz="1700" dirty="0">
                           <a:effectLst/>
                         </a:rPr>
                         <a:t>12 PM - 4 PM : Teams</a:t>
                       </a:r>
-                      <a:endParaRPr lang="en-US" sz="1600" dirty="0">
-                        <a:effectLst/>
-                        <a:latin typeface="Calibri" panose="020F0502020204030204" pitchFamily="34" charset="0"/>
-                        <a:ea typeface="Calibri" panose="020F0502020204030204" pitchFamily="34" charset="0"/>
-                        <a:cs typeface="Times New Roman" panose="02020603050405020304" pitchFamily="18" charset="0"/>
-                      </a:endParaRPr>
                     </a:p>
                   </a:txBody>
-                  <a:tcPr marL="15875" marR="15875" marT="15875" marB="15875" anchor="ctr">
-                    <a:lnL w="12700" cap="flat" cmpd="sng" algn="ctr">
+                  <a:tcPr marL="15681" marR="15681" marT="15681" marB="15681" anchor="ctr">
+                    <a:lnL w="6350" cap="flat" cmpd="sng" algn="ctr">
                       <a:solidFill>
-                        <a:schemeClr val="tx1"/>
+                        <a:srgbClr val="E0E0E0"/>
                       </a:solidFill>
                       <a:prstDash val="solid"/>
                       <a:round/>
                       <a:headEnd type="none" w="med" len="med"/>
                       <a:tailEnd type="none" w="med" len="med"/>
                     </a:lnL>
-                    <a:lnR w="12700" cap="flat" cmpd="sng" algn="ctr">
+                    <a:lnR w="6350" cap="flat" cmpd="sng" algn="ctr">
                       <a:solidFill>
-                        <a:schemeClr val="tx1"/>
+                        <a:srgbClr val="E0E0E0"/>
                       </a:solidFill>
                       <a:prstDash val="solid"/>
                       <a:round/>
                       <a:headEnd type="none" w="med" len="med"/>
                       <a:tailEnd type="none" w="med" len="med"/>
                     </a:lnR>
-                    <a:lnT w="12700" cap="flat" cmpd="sng" algn="ctr">
+                    <a:lnT w="6350" cap="flat" cmpd="sng" algn="ctr">
                       <a:solidFill>
-                        <a:schemeClr val="tx1"/>
+                        <a:srgbClr val="E0E0E0"/>
                       </a:solidFill>
                       <a:prstDash val="solid"/>
                       <a:round/>
                       <a:headEnd type="none" w="med" len="med"/>
                       <a:tailEnd type="none" w="med" len="med"/>
                     </a:lnT>
-                    <a:lnB w="12700" cap="flat" cmpd="sng" algn="ctr">
+                    <a:lnB w="6350" cap="flat" cmpd="sng" algn="ctr">
                       <a:solidFill>
-                        <a:schemeClr val="tx1"/>
+                        <a:srgbClr val="E0E0E0"/>
                       </a:solidFill>
                       <a:prstDash val="solid"/>
                       <a:round/>
                       <a:headEnd type="none" w="med" len="med"/>
                       <a:tailEnd type="none" w="med" len="med"/>
                     </a:lnB>
-                    <a:lnTlToBr w="12700" cmpd="sng">
-                      <a:noFill/>
-                      <a:prstDash val="solid"/>
-                    </a:lnTlToBr>
-                    <a:lnBlToTr w="12700" cmpd="sng">
-                      <a:noFill/>
-                      <a:prstDash val="solid"/>
-                    </a:lnBlToTr>
                     <a:solidFill>
-                      <a:schemeClr val="bg1"/>
+                      <a:srgbClr val="FFFFFF"/>
                     </a:solidFill>
                   </a:tcPr>
                 </a:tc>
                 <a:extLst>
                   <a:ext uri="{0D108BD9-81ED-4DB2-BD59-A6C34878D82A}">
-                    <a16:rowId xmlns:a16="http://schemas.microsoft.com/office/drawing/2014/main" val="1928039740"/>
+                    <a16:rowId xmlns:a16="http://schemas.microsoft.com/office/drawing/2014/main" val="1778919050"/>
                   </a:ext>
                 </a:extLst>
               </a:tr>
@@ -21421,8 +21039,8 @@
         </p:nvSpPr>
         <p:spPr>
           <a:xfrm>
-            <a:off x="6377940" y="1711730"/>
-            <a:ext cx="8412480" cy="6803144"/>
+            <a:off x="6241886" y="1711730"/>
+            <a:ext cx="7724485" cy="5612611"/>
           </a:xfrm>
         </p:spPr>
         <p:txBody>
@@ -21519,7 +21137,7 @@
               <a:rPr lang="en-US" b="1" dirty="0">
                 <a:latin typeface="Consolas" panose="020B0609020204030204" pitchFamily="49" charset="0"/>
               </a:rPr>
-              <a:t>(new File(“notes.txt”);</a:t>
+              <a:t>(new File(“notes.txt”));</a:t>
             </a:r>
           </a:p>
           <a:p>
@@ -21580,7 +21198,7 @@
               <a:rPr lang="en-US" b="1" dirty="0">
                 <a:latin typeface="Consolas" panose="020B0609020204030204" pitchFamily="49" charset="0"/>
               </a:rPr>
-              <a:t>(“notes.txt”);</a:t>
+              <a:t>(“notes.txt”));</a:t>
             </a:r>
           </a:p>
           <a:p>
@@ -21627,7 +21245,7 @@
         </p:blipFill>
         <p:spPr>
           <a:xfrm>
-            <a:off x="249275" y="1711731"/>
+            <a:off x="151304" y="1711730"/>
             <a:ext cx="6069899" cy="3786099"/>
           </a:xfrm>
           <a:prstGeom prst="rect">

</xml_diff>